<commit_message>
docs: updated PPT and README file
</commit_message>
<xml_diff>
--- a/docs/4flow_data_engineer_case.pptx
+++ b/docs/4flow_data_engineer_case.pptx
@@ -19,6 +19,8 @@
     <p:sldId id="267" r:id="rId13"/>
     <p:sldId id="268" r:id="rId14"/>
     <p:sldId id="269" r:id="rId15"/>
+    <p:sldId id="270" r:id="rId16"/>
+    <p:sldId id="271" r:id="rId17"/>
   </p:sldIdLst>
   <p:sldSz cx="12192000" cy="6858000"/>
   <p:notesSz cx="6858000" cy="9144000"/>
@@ -117,6 +119,11 @@
       </a:defRPr>
     </a:lvl9pPr>
   </p:defaultTextStyle>
+  <p:extLst>
+    <p:ext uri="{EFAFB233-063F-42B5-8137-9DF3F51BA10A}">
+      <p15:sldGuideLst xmlns:p15="http://schemas.microsoft.com/office/powerpoint/2012/main"/>
+    </p:ext>
+  </p:extLst>
 </p:presentation>
 </file>
 
@@ -4974,6 +4981,501 @@
     <p:extLst>
       <p:ext uri="{BB962C8B-B14F-4D97-AF65-F5344CB8AC3E}">
         <p14:creationId xmlns:p14="http://schemas.microsoft.com/office/powerpoint/2010/main" val="820453115"/>
+      </p:ext>
+    </p:extLst>
+  </p:cSld>
+  <p:clrMapOvr>
+    <a:masterClrMapping/>
+  </p:clrMapOvr>
+</p:sld>
+</file>
+
+<file path=ppt/slides/slide15.xml><?xml version="1.0" encoding="utf-8"?>
+<p:sld xmlns:a="http://schemas.openxmlformats.org/drawingml/2006/main" xmlns:r="http://schemas.openxmlformats.org/officeDocument/2006/relationships" xmlns:p="http://schemas.openxmlformats.org/presentationml/2006/main">
+  <p:cSld>
+    <p:spTree>
+      <p:nvGrpSpPr>
+        <p:cNvPr id="1" name=""/>
+        <p:cNvGrpSpPr/>
+        <p:nvPr/>
+      </p:nvGrpSpPr>
+      <p:grpSpPr>
+        <a:xfrm>
+          <a:off x="0" y="0"/>
+          <a:ext cx="0" cy="0"/>
+          <a:chOff x="0" y="0"/>
+          <a:chExt cx="0" cy="0"/>
+        </a:xfrm>
+      </p:grpSpPr>
+      <p:sp>
+        <p:nvSpPr>
+          <p:cNvPr id="2" name="Title 1">
+            <a:extLst>
+              <a:ext uri="{FF2B5EF4-FFF2-40B4-BE49-F238E27FC236}">
+                <a16:creationId xmlns:a16="http://schemas.microsoft.com/office/drawing/2014/main" id="{C98DC1C3-45B6-B495-5B02-4242DDE237BE}"/>
+              </a:ext>
+            </a:extLst>
+          </p:cNvPr>
+          <p:cNvSpPr>
+            <a:spLocks noGrp="1"/>
+          </p:cNvSpPr>
+          <p:nvPr>
+            <p:ph type="title"/>
+          </p:nvPr>
+        </p:nvSpPr>
+        <p:spPr/>
+        <p:txBody>
+          <a:bodyPr/>
+          <a:lstStyle/>
+          <a:p>
+            <a:r>
+              <a:rPr lang="pt-BR" dirty="0"/>
+              <a:t>8) </a:t>
+            </a:r>
+            <a:r>
+              <a:rPr lang="pt-BR" dirty="0" err="1"/>
+              <a:t>next</a:t>
+            </a:r>
+            <a:r>
+              <a:rPr lang="pt-BR" dirty="0"/>
+              <a:t> steps</a:t>
+            </a:r>
+          </a:p>
+        </p:txBody>
+      </p:sp>
+      <p:sp>
+        <p:nvSpPr>
+          <p:cNvPr id="3" name="Content Placeholder 2">
+            <a:extLst>
+              <a:ext uri="{FF2B5EF4-FFF2-40B4-BE49-F238E27FC236}">
+                <a16:creationId xmlns:a16="http://schemas.microsoft.com/office/drawing/2014/main" id="{7B5199C8-9223-E6B4-B017-33A8C0AD8EC9}"/>
+              </a:ext>
+            </a:extLst>
+          </p:cNvPr>
+          <p:cNvSpPr>
+            <a:spLocks noGrp="1"/>
+          </p:cNvSpPr>
+          <p:nvPr>
+            <p:ph idx="1"/>
+          </p:nvPr>
+        </p:nvSpPr>
+        <p:spPr/>
+        <p:txBody>
+          <a:bodyPr>
+            <a:normAutofit fontScale="85000" lnSpcReduction="20000"/>
+          </a:bodyPr>
+          <a:lstStyle/>
+          <a:p>
+            <a:r>
+              <a:rPr lang="pt-BR" dirty="0"/>
+              <a:t>Improve </a:t>
+            </a:r>
+            <a:r>
+              <a:rPr lang="pt-BR" dirty="0" err="1"/>
+              <a:t>monitoring</a:t>
+            </a:r>
+            <a:r>
+              <a:rPr lang="pt-BR" dirty="0"/>
+              <a:t> </a:t>
+            </a:r>
+            <a:r>
+              <a:rPr lang="pt-BR" dirty="0" err="1"/>
+              <a:t>stages</a:t>
+            </a:r>
+            <a:r>
+              <a:rPr lang="pt-BR" dirty="0"/>
+              <a:t> in pipeline</a:t>
+            </a:r>
+          </a:p>
+          <a:p>
+            <a:endParaRPr lang="pt-BR" dirty="0"/>
+          </a:p>
+          <a:p>
+            <a:r>
+              <a:rPr lang="pt-BR" dirty="0"/>
+              <a:t>Correlate </a:t>
+            </a:r>
+            <a:r>
+              <a:rPr lang="pt-BR" dirty="0" err="1"/>
+              <a:t>complaints</a:t>
+            </a:r>
+            <a:r>
+              <a:rPr lang="pt-BR" dirty="0"/>
+              <a:t> </a:t>
+            </a:r>
+            <a:r>
+              <a:rPr lang="pt-BR" dirty="0" err="1"/>
+              <a:t>and</a:t>
+            </a:r>
+            <a:r>
+              <a:rPr lang="pt-BR" dirty="0"/>
+              <a:t> delivery </a:t>
+            </a:r>
+            <a:r>
+              <a:rPr lang="pt-BR" dirty="0" err="1"/>
+              <a:t>events</a:t>
+            </a:r>
+            <a:r>
+              <a:rPr lang="pt-BR" dirty="0"/>
+              <a:t> </a:t>
+            </a:r>
+            <a:r>
+              <a:rPr lang="pt-BR" dirty="0" err="1"/>
+              <a:t>using</a:t>
+            </a:r>
+            <a:r>
+              <a:rPr lang="pt-BR" dirty="0"/>
+              <a:t> </a:t>
+            </a:r>
+            <a:r>
+              <a:rPr lang="pt-BR" i="1" dirty="0" err="1"/>
+              <a:t>parcel_id</a:t>
+            </a:r>
+            <a:r>
+              <a:rPr lang="pt-BR" i="1" dirty="0"/>
+              <a:t> </a:t>
+            </a:r>
+            <a:r>
+              <a:rPr lang="pt-BR" dirty="0" err="1"/>
+              <a:t>or</a:t>
+            </a:r>
+            <a:r>
+              <a:rPr lang="pt-BR" dirty="0"/>
+              <a:t> </a:t>
+            </a:r>
+            <a:r>
+              <a:rPr lang="pt-BR" i="1" dirty="0" err="1"/>
+              <a:t>purchase_order_id</a:t>
+            </a:r>
+            <a:r>
+              <a:rPr lang="pt-BR" dirty="0"/>
+              <a:t> </a:t>
+            </a:r>
+            <a:r>
+              <a:rPr lang="pt-BR" dirty="0" err="1"/>
+              <a:t>whenever</a:t>
+            </a:r>
+            <a:r>
+              <a:rPr lang="pt-BR" dirty="0"/>
+              <a:t> </a:t>
+            </a:r>
+            <a:r>
+              <a:rPr lang="pt-BR" dirty="0" err="1"/>
+              <a:t>possible</a:t>
+            </a:r>
+            <a:endParaRPr lang="pt-BR" dirty="0"/>
+          </a:p>
+          <a:p>
+            <a:endParaRPr lang="pt-BR" dirty="0"/>
+          </a:p>
+          <a:p>
+            <a:r>
+              <a:rPr lang="pt-BR" dirty="0" err="1"/>
+              <a:t>Create</a:t>
+            </a:r>
+            <a:r>
+              <a:rPr lang="pt-BR" dirty="0"/>
+              <a:t> a </a:t>
+            </a:r>
+            <a:r>
+              <a:rPr lang="pt-BR" dirty="0" err="1"/>
+              <a:t>crosswalk</a:t>
+            </a:r>
+            <a:r>
+              <a:rPr lang="pt-BR" dirty="0"/>
+              <a:t> </a:t>
+            </a:r>
+            <a:r>
+              <a:rPr lang="pt-BR" dirty="0" err="1"/>
+              <a:t>table</a:t>
+            </a:r>
+            <a:r>
+              <a:rPr lang="pt-BR" dirty="0"/>
+              <a:t> </a:t>
+            </a:r>
+            <a:r>
+              <a:rPr lang="pt-BR" dirty="0" err="1"/>
+              <a:t>allowing</a:t>
+            </a:r>
+            <a:r>
+              <a:rPr lang="pt-BR" dirty="0"/>
+              <a:t> a more precise </a:t>
+            </a:r>
+            <a:r>
+              <a:rPr lang="pt-BR" dirty="0" err="1"/>
+              <a:t>conection</a:t>
+            </a:r>
+            <a:r>
+              <a:rPr lang="pt-BR" dirty="0"/>
+              <a:t> </a:t>
+            </a:r>
+            <a:r>
+              <a:rPr lang="pt-BR" dirty="0" err="1"/>
+              <a:t>between</a:t>
+            </a:r>
+            <a:r>
+              <a:rPr lang="pt-BR" dirty="0"/>
+              <a:t> delivery </a:t>
+            </a:r>
+            <a:r>
+              <a:rPr lang="pt-BR" dirty="0" err="1"/>
+              <a:t>events</a:t>
+            </a:r>
+            <a:r>
+              <a:rPr lang="pt-BR" dirty="0"/>
+              <a:t> </a:t>
+            </a:r>
+            <a:r>
+              <a:rPr lang="pt-BR" dirty="0" err="1"/>
+              <a:t>and</a:t>
+            </a:r>
+            <a:r>
+              <a:rPr lang="pt-BR" dirty="0"/>
+              <a:t> </a:t>
+            </a:r>
+            <a:r>
+              <a:rPr lang="pt-BR" dirty="0" err="1"/>
+              <a:t>complaints</a:t>
+            </a:r>
+            <a:endParaRPr lang="pt-BR" dirty="0"/>
+          </a:p>
+          <a:p>
+            <a:endParaRPr lang="pt-BR" dirty="0"/>
+          </a:p>
+          <a:p>
+            <a:r>
+              <a:rPr lang="pt-BR" dirty="0"/>
+              <a:t>Draw insights </a:t>
+            </a:r>
+            <a:r>
+              <a:rPr lang="pt-BR" dirty="0" err="1"/>
+              <a:t>from</a:t>
+            </a:r>
+            <a:r>
+              <a:rPr lang="pt-BR" dirty="0"/>
+              <a:t> drivers, </a:t>
+            </a:r>
+            <a:r>
+              <a:rPr lang="pt-BR" dirty="0" err="1"/>
+              <a:t>recipients</a:t>
+            </a:r>
+            <a:r>
+              <a:rPr lang="pt-BR" dirty="0"/>
+              <a:t> </a:t>
+            </a:r>
+            <a:r>
+              <a:rPr lang="pt-BR" dirty="0" err="1"/>
+              <a:t>and</a:t>
+            </a:r>
+            <a:r>
+              <a:rPr lang="pt-BR" dirty="0"/>
+              <a:t> </a:t>
+            </a:r>
+            <a:r>
+              <a:rPr lang="pt-BR" dirty="0" err="1"/>
+              <a:t>stations</a:t>
+            </a:r>
+            <a:r>
+              <a:rPr lang="pt-BR" dirty="0"/>
+              <a:t> in </a:t>
+            </a:r>
+            <a:r>
+              <a:rPr lang="pt-BR" dirty="0" err="1"/>
+              <a:t>terms</a:t>
+            </a:r>
+            <a:r>
+              <a:rPr lang="pt-BR" dirty="0"/>
+              <a:t> </a:t>
+            </a:r>
+            <a:r>
+              <a:rPr lang="pt-BR" dirty="0" err="1"/>
+              <a:t>of</a:t>
+            </a:r>
+            <a:r>
+              <a:rPr lang="pt-BR" dirty="0"/>
+              <a:t> </a:t>
+            </a:r>
+            <a:r>
+              <a:rPr lang="pt-BR" dirty="0" err="1"/>
+              <a:t>number</a:t>
+            </a:r>
+            <a:r>
+              <a:rPr lang="pt-BR" dirty="0"/>
+              <a:t> </a:t>
+            </a:r>
+            <a:r>
+              <a:rPr lang="pt-BR" dirty="0" err="1"/>
+              <a:t>of</a:t>
+            </a:r>
+            <a:r>
+              <a:rPr lang="pt-BR" dirty="0"/>
+              <a:t> deliveries </a:t>
+            </a:r>
+            <a:r>
+              <a:rPr lang="pt-BR" dirty="0" err="1"/>
+              <a:t>and</a:t>
+            </a:r>
+            <a:r>
+              <a:rPr lang="pt-BR" dirty="0"/>
+              <a:t> </a:t>
+            </a:r>
+            <a:r>
+              <a:rPr lang="pt-BR" dirty="0" err="1"/>
+              <a:t>number</a:t>
+            </a:r>
+            <a:r>
+              <a:rPr lang="pt-BR" dirty="0"/>
+              <a:t> </a:t>
+            </a:r>
+            <a:r>
+              <a:rPr lang="pt-BR" dirty="0" err="1"/>
+              <a:t>of</a:t>
+            </a:r>
+            <a:r>
+              <a:rPr lang="pt-BR" dirty="0"/>
+              <a:t> </a:t>
+            </a:r>
+            <a:r>
+              <a:rPr lang="pt-BR" dirty="0" err="1"/>
+              <a:t>complaints</a:t>
+            </a:r>
+            <a:endParaRPr lang="pt-BR" dirty="0"/>
+          </a:p>
+          <a:p>
+            <a:endParaRPr lang="pt-BR" dirty="0"/>
+          </a:p>
+          <a:p>
+            <a:r>
+              <a:rPr lang="pt-BR" dirty="0"/>
+              <a:t>Use LLM </a:t>
+            </a:r>
+            <a:r>
+              <a:rPr lang="pt-BR" dirty="0" err="1"/>
+              <a:t>to</a:t>
+            </a:r>
+            <a:r>
+              <a:rPr lang="pt-BR" dirty="0"/>
+              <a:t> </a:t>
+            </a:r>
+            <a:r>
+              <a:rPr lang="pt-BR" dirty="0" err="1"/>
+              <a:t>evaluate</a:t>
+            </a:r>
+            <a:r>
+              <a:rPr lang="pt-BR" dirty="0"/>
+              <a:t> </a:t>
+            </a:r>
+            <a:r>
+              <a:rPr lang="pt-BR" dirty="0" err="1"/>
+              <a:t>the</a:t>
+            </a:r>
+            <a:r>
+              <a:rPr lang="pt-BR" dirty="0"/>
+              <a:t> </a:t>
+            </a:r>
+            <a:r>
+              <a:rPr lang="pt-BR" dirty="0" err="1"/>
+              <a:t>claims</a:t>
+            </a:r>
+            <a:r>
+              <a:rPr lang="pt-BR" dirty="0"/>
+              <a:t> </a:t>
+            </a:r>
+            <a:r>
+              <a:rPr lang="pt-BR" dirty="0" err="1"/>
+              <a:t>contents</a:t>
+            </a:r>
+            <a:endParaRPr lang="pt-BR" dirty="0"/>
+          </a:p>
+          <a:p>
+            <a:endParaRPr lang="pt-BR" dirty="0"/>
+          </a:p>
+        </p:txBody>
+      </p:sp>
+    </p:spTree>
+    <p:extLst>
+      <p:ext uri="{BB962C8B-B14F-4D97-AF65-F5344CB8AC3E}">
+        <p14:creationId xmlns:p14="http://schemas.microsoft.com/office/powerpoint/2010/main" val="2876965201"/>
+      </p:ext>
+    </p:extLst>
+  </p:cSld>
+  <p:clrMapOvr>
+    <a:masterClrMapping/>
+  </p:clrMapOvr>
+</p:sld>
+</file>
+
+<file path=ppt/slides/slide16.xml><?xml version="1.0" encoding="utf-8"?>
+<p:sld xmlns:a="http://schemas.openxmlformats.org/drawingml/2006/main" xmlns:r="http://schemas.openxmlformats.org/officeDocument/2006/relationships" xmlns:p="http://schemas.openxmlformats.org/presentationml/2006/main">
+  <p:cSld>
+    <p:spTree>
+      <p:nvGrpSpPr>
+        <p:cNvPr id="1" name=""/>
+        <p:cNvGrpSpPr/>
+        <p:nvPr/>
+      </p:nvGrpSpPr>
+      <p:grpSpPr>
+        <a:xfrm>
+          <a:off x="0" y="0"/>
+          <a:ext cx="0" cy="0"/>
+          <a:chOff x="0" y="0"/>
+          <a:chExt cx="0" cy="0"/>
+        </a:xfrm>
+      </p:grpSpPr>
+      <p:sp>
+        <p:nvSpPr>
+          <p:cNvPr id="2" name="Title 1">
+            <a:extLst>
+              <a:ext uri="{FF2B5EF4-FFF2-40B4-BE49-F238E27FC236}">
+                <a16:creationId xmlns:a16="http://schemas.microsoft.com/office/drawing/2014/main" id="{0344A75C-BE41-6E21-8DA7-1D1EB81FD984}"/>
+              </a:ext>
+            </a:extLst>
+          </p:cNvPr>
+          <p:cNvSpPr>
+            <a:spLocks noGrp="1"/>
+          </p:cNvSpPr>
+          <p:nvPr>
+            <p:ph type="title"/>
+          </p:nvPr>
+        </p:nvSpPr>
+        <p:spPr/>
+        <p:txBody>
+          <a:bodyPr/>
+          <a:lstStyle/>
+          <a:p>
+            <a:endParaRPr lang="pt-BR"/>
+          </a:p>
+        </p:txBody>
+      </p:sp>
+      <p:sp>
+        <p:nvSpPr>
+          <p:cNvPr id="3" name="Content Placeholder 2">
+            <a:extLst>
+              <a:ext uri="{FF2B5EF4-FFF2-40B4-BE49-F238E27FC236}">
+                <a16:creationId xmlns:a16="http://schemas.microsoft.com/office/drawing/2014/main" id="{62488288-CBD9-CE58-8162-D7C12E85188B}"/>
+              </a:ext>
+            </a:extLst>
+          </p:cNvPr>
+          <p:cNvSpPr>
+            <a:spLocks noGrp="1"/>
+          </p:cNvSpPr>
+          <p:nvPr>
+            <p:ph idx="1"/>
+          </p:nvPr>
+        </p:nvSpPr>
+        <p:spPr/>
+        <p:txBody>
+          <a:bodyPr/>
+          <a:lstStyle/>
+          <a:p>
+            <a:endParaRPr lang="pt-BR"/>
+          </a:p>
+        </p:txBody>
+      </p:sp>
+    </p:spTree>
+    <p:extLst>
+      <p:ext uri="{BB962C8B-B14F-4D97-AF65-F5344CB8AC3E}">
+        <p14:creationId xmlns:p14="http://schemas.microsoft.com/office/powerpoint/2010/main" val="2549613941"/>
       </p:ext>
     </p:extLst>
   </p:cSld>

</xml_diff>